<commit_message>
Update Digital control - lecture 6.pptx
</commit_message>
<xml_diff>
--- a/Digital control - lecture 6.pptx
+++ b/Digital control - lecture 6.pptx
@@ -273,7 +273,7 @@
           <a:p>
             <a:fld id="{EE9644A6-59D6-464D-AD1A-3A8F82524950}" type="datetimeFigureOut">
               <a:rPr lang="en-US" smtClean="0"/>
-              <a:t>4/1/2019</a:t>
+              <a:t>11/2/2019</a:t>
             </a:fld>
             <a:endParaRPr lang="en-US"/>
           </a:p>
@@ -471,7 +471,7 @@
           <a:p>
             <a:fld id="{EE9644A6-59D6-464D-AD1A-3A8F82524950}" type="datetimeFigureOut">
               <a:rPr lang="en-US" smtClean="0"/>
-              <a:t>4/1/2019</a:t>
+              <a:t>11/2/2019</a:t>
             </a:fld>
             <a:endParaRPr lang="en-US"/>
           </a:p>
@@ -679,7 +679,7 @@
           <a:p>
             <a:fld id="{EE9644A6-59D6-464D-AD1A-3A8F82524950}" type="datetimeFigureOut">
               <a:rPr lang="en-US" smtClean="0"/>
-              <a:t>4/1/2019</a:t>
+              <a:t>11/2/2019</a:t>
             </a:fld>
             <a:endParaRPr lang="en-US"/>
           </a:p>
@@ -877,7 +877,7 @@
           <a:p>
             <a:fld id="{EE9644A6-59D6-464D-AD1A-3A8F82524950}" type="datetimeFigureOut">
               <a:rPr lang="en-US" smtClean="0"/>
-              <a:t>4/1/2019</a:t>
+              <a:t>11/2/2019</a:t>
             </a:fld>
             <a:endParaRPr lang="en-US"/>
           </a:p>
@@ -1152,7 +1152,7 @@
           <a:p>
             <a:fld id="{EE9644A6-59D6-464D-AD1A-3A8F82524950}" type="datetimeFigureOut">
               <a:rPr lang="en-US" smtClean="0"/>
-              <a:t>4/1/2019</a:t>
+              <a:t>11/2/2019</a:t>
             </a:fld>
             <a:endParaRPr lang="en-US"/>
           </a:p>
@@ -1417,7 +1417,7 @@
           <a:p>
             <a:fld id="{EE9644A6-59D6-464D-AD1A-3A8F82524950}" type="datetimeFigureOut">
               <a:rPr lang="en-US" smtClean="0"/>
-              <a:t>4/1/2019</a:t>
+              <a:t>11/2/2019</a:t>
             </a:fld>
             <a:endParaRPr lang="en-US"/>
           </a:p>
@@ -1829,7 +1829,7 @@
           <a:p>
             <a:fld id="{EE9644A6-59D6-464D-AD1A-3A8F82524950}" type="datetimeFigureOut">
               <a:rPr lang="en-US" smtClean="0"/>
-              <a:t>4/1/2019</a:t>
+              <a:t>11/2/2019</a:t>
             </a:fld>
             <a:endParaRPr lang="en-US"/>
           </a:p>
@@ -1970,7 +1970,7 @@
           <a:p>
             <a:fld id="{EE9644A6-59D6-464D-AD1A-3A8F82524950}" type="datetimeFigureOut">
               <a:rPr lang="en-US" smtClean="0"/>
-              <a:t>4/1/2019</a:t>
+              <a:t>11/2/2019</a:t>
             </a:fld>
             <a:endParaRPr lang="en-US"/>
           </a:p>
@@ -2083,7 +2083,7 @@
           <a:p>
             <a:fld id="{EE9644A6-59D6-464D-AD1A-3A8F82524950}" type="datetimeFigureOut">
               <a:rPr lang="en-US" smtClean="0"/>
-              <a:t>4/1/2019</a:t>
+              <a:t>11/2/2019</a:t>
             </a:fld>
             <a:endParaRPr lang="en-US"/>
           </a:p>
@@ -2394,7 +2394,7 @@
           <a:p>
             <a:fld id="{EE9644A6-59D6-464D-AD1A-3A8F82524950}" type="datetimeFigureOut">
               <a:rPr lang="en-US" smtClean="0"/>
-              <a:t>4/1/2019</a:t>
+              <a:t>11/2/2019</a:t>
             </a:fld>
             <a:endParaRPr lang="en-US"/>
           </a:p>
@@ -2682,7 +2682,7 @@
           <a:p>
             <a:fld id="{EE9644A6-59D6-464D-AD1A-3A8F82524950}" type="datetimeFigureOut">
               <a:rPr lang="en-US" smtClean="0"/>
-              <a:t>4/1/2019</a:t>
+              <a:t>11/2/2019</a:t>
             </a:fld>
             <a:endParaRPr lang="en-US"/>
           </a:p>
@@ -2923,7 +2923,7 @@
           <a:p>
             <a:fld id="{EE9644A6-59D6-464D-AD1A-3A8F82524950}" type="datetimeFigureOut">
               <a:rPr lang="en-US" smtClean="0"/>
-              <a:t>4/1/2019</a:t>
+              <a:t>11/2/2019</a:t>
             </a:fld>
             <a:endParaRPr lang="en-US"/>
           </a:p>
@@ -5227,8 +5227,8 @@
           </a:p>
         </p:txBody>
       </p:sp>
-      <mc:AlternateContent xmlns:mc="http://schemas.openxmlformats.org/markup-compatibility/2006">
-        <mc:Choice xmlns:a14="http://schemas.microsoft.com/office/drawing/2010/main" Requires="a14">
+      <mc:AlternateContent xmlns:mc="http://schemas.openxmlformats.org/markup-compatibility/2006" xmlns:a14="http://schemas.microsoft.com/office/drawing/2010/main">
+        <mc:Choice Requires="a14">
           <p:sp>
             <p:nvSpPr>
               <p:cNvPr id="26" name="Object 2">
@@ -5958,7 +5958,7 @@
             </p:txBody>
           </p:sp>
         </mc:Choice>
-        <mc:Fallback>
+        <mc:Fallback xmlns="">
           <p:sp>
             <p:nvSpPr>
               <p:cNvPr id="26" name="Object 2">
@@ -6045,8 +6045,8 @@
           </a:p>
         </p:txBody>
       </p:sp>
-      <mc:AlternateContent xmlns:mc="http://schemas.openxmlformats.org/markup-compatibility/2006">
-        <mc:Choice xmlns:a14="http://schemas.microsoft.com/office/drawing/2010/main" Requires="a14">
+      <mc:AlternateContent xmlns:mc="http://schemas.openxmlformats.org/markup-compatibility/2006" xmlns:a14="http://schemas.microsoft.com/office/drawing/2010/main">
+        <mc:Choice Requires="a14">
           <p:sp>
             <p:nvSpPr>
               <p:cNvPr id="28" name="Object 6">
@@ -6451,7 +6451,7 @@
             </p:txBody>
           </p:sp>
         </mc:Choice>
-        <mc:Fallback>
+        <mc:Fallback xmlns="">
           <p:sp>
             <p:nvSpPr>
               <p:cNvPr id="28" name="Object 6">
@@ -6903,8 +6903,8 @@
           </a:p>
         </p:txBody>
       </p:sp>
-      <mc:AlternateContent xmlns:mc="http://schemas.openxmlformats.org/markup-compatibility/2006">
-        <mc:Choice xmlns:a14="http://schemas.microsoft.com/office/drawing/2010/main" Requires="a14">
+      <mc:AlternateContent xmlns:mc="http://schemas.openxmlformats.org/markup-compatibility/2006" xmlns:a14="http://schemas.microsoft.com/office/drawing/2010/main">
+        <mc:Choice Requires="a14">
           <p:sp>
             <p:nvSpPr>
               <p:cNvPr id="23" name="Object 1">
@@ -7115,7 +7115,7 @@
             </p:txBody>
           </p:sp>
         </mc:Choice>
-        <mc:Fallback>
+        <mc:Fallback xmlns="">
           <p:sp>
             <p:nvSpPr>
               <p:cNvPr id="23" name="Object 1">
@@ -7228,8 +7228,8 @@
           </a:p>
         </p:txBody>
       </p:sp>
-      <mc:AlternateContent xmlns:mc="http://schemas.openxmlformats.org/markup-compatibility/2006">
-        <mc:Choice xmlns:a14="http://schemas.microsoft.com/office/drawing/2010/main" Requires="a14">
+      <mc:AlternateContent xmlns:mc="http://schemas.openxmlformats.org/markup-compatibility/2006" xmlns:a14="http://schemas.microsoft.com/office/drawing/2010/main">
+        <mc:Choice Requires="a14">
           <p:sp>
             <p:nvSpPr>
               <p:cNvPr id="29" name="Object 1">
@@ -7390,7 +7390,7 @@
             </p:txBody>
           </p:sp>
         </mc:Choice>
-        <mc:Fallback>
+        <mc:Fallback xmlns="">
           <p:sp>
             <p:nvSpPr>
               <p:cNvPr id="29" name="Object 1">
@@ -7510,8 +7510,8 @@
           </a:p>
         </p:txBody>
       </p:sp>
-      <mc:AlternateContent xmlns:mc="http://schemas.openxmlformats.org/markup-compatibility/2006">
-        <mc:Choice xmlns:a14="http://schemas.microsoft.com/office/drawing/2010/main" Requires="a14">
+      <mc:AlternateContent xmlns:mc="http://schemas.openxmlformats.org/markup-compatibility/2006" xmlns:a14="http://schemas.microsoft.com/office/drawing/2010/main">
+        <mc:Choice Requires="a14">
           <p:sp>
             <p:nvSpPr>
               <p:cNvPr id="46" name="Object 1">
@@ -7894,7 +7894,7 @@
             </p:txBody>
           </p:sp>
         </mc:Choice>
-        <mc:Fallback>
+        <mc:Fallback xmlns="">
           <p:sp>
             <p:nvSpPr>
               <p:cNvPr id="46" name="Object 1">
@@ -7939,8 +7939,8 @@
           </p:sp>
         </mc:Fallback>
       </mc:AlternateContent>
-      <mc:AlternateContent xmlns:mc="http://schemas.openxmlformats.org/markup-compatibility/2006">
-        <mc:Choice xmlns:a14="http://schemas.microsoft.com/office/drawing/2010/main" Requires="a14">
+      <mc:AlternateContent xmlns:mc="http://schemas.openxmlformats.org/markup-compatibility/2006" xmlns:a14="http://schemas.microsoft.com/office/drawing/2010/main">
+        <mc:Choice Requires="a14">
           <p:sp>
             <p:nvSpPr>
               <p:cNvPr id="47" name="Object 1">
@@ -8284,7 +8284,7 @@
             </p:txBody>
           </p:sp>
         </mc:Choice>
-        <mc:Fallback>
+        <mc:Fallback xmlns="">
           <p:sp>
             <p:nvSpPr>
               <p:cNvPr id="47" name="Object 1">
@@ -8329,8 +8329,8 @@
           </p:sp>
         </mc:Fallback>
       </mc:AlternateContent>
-      <mc:AlternateContent xmlns:mc="http://schemas.openxmlformats.org/markup-compatibility/2006">
-        <mc:Choice xmlns:a14="http://schemas.microsoft.com/office/drawing/2010/main" Requires="a14">
+      <mc:AlternateContent xmlns:mc="http://schemas.openxmlformats.org/markup-compatibility/2006" xmlns:a14="http://schemas.microsoft.com/office/drawing/2010/main">
+        <mc:Choice Requires="a14">
           <p:sp>
             <p:nvSpPr>
               <p:cNvPr id="48" name="Object 1">
@@ -8683,7 +8683,7 @@
             </p:txBody>
           </p:sp>
         </mc:Choice>
-        <mc:Fallback>
+        <mc:Fallback xmlns="">
           <p:sp>
             <p:nvSpPr>
               <p:cNvPr id="48" name="Object 1">
@@ -8728,8 +8728,8 @@
           </p:sp>
         </mc:Fallback>
       </mc:AlternateContent>
-      <mc:AlternateContent xmlns:mc="http://schemas.openxmlformats.org/markup-compatibility/2006">
-        <mc:Choice xmlns:a14="http://schemas.microsoft.com/office/drawing/2010/main" Requires="a14">
+      <mc:AlternateContent xmlns:mc="http://schemas.openxmlformats.org/markup-compatibility/2006" xmlns:a14="http://schemas.microsoft.com/office/drawing/2010/main">
+        <mc:Choice Requires="a14">
           <p:sp>
             <p:nvSpPr>
               <p:cNvPr id="49" name="Object 1">
@@ -9040,7 +9040,7 @@
             </p:txBody>
           </p:sp>
         </mc:Choice>
-        <mc:Fallback>
+        <mc:Fallback xmlns="">
           <p:sp>
             <p:nvSpPr>
               <p:cNvPr id="49" name="Object 1">
@@ -9816,7 +9816,7 @@
             </p:spPr>
             <p:txBody>
               <a:bodyPr>
-                <a:normAutofit/>
+                <a:normAutofit fontScale="85000" lnSpcReduction="10000"/>
               </a:bodyPr>
               <a:lstStyle/>
               <a:p>
@@ -9828,40 +9828,45 @@
                     </m:oMathParaPr>
                     <m:oMath xmlns:m="http://schemas.openxmlformats.org/officeDocument/2006/math">
                       <m:r>
+                        <a:rPr lang="en-US" sz="2400" i="1" smtClean="0">
+                          <a:solidFill>
+                            <a:srgbClr val="000000"/>
+                          </a:solidFill>
+                          <a:latin typeface="Cambria Math" panose="02040503050406030204" pitchFamily="18" charset="0"/>
+                        </a:rPr>
+                        <m:t>𝐻</m:t>
+                      </m:r>
+                      <m:d>
+                        <m:dPr>
+                          <m:ctrlPr>
+                            <a:rPr lang="en-US" sz="2400" i="1">
+                              <a:solidFill>
+                                <a:srgbClr val="000000"/>
+                              </a:solidFill>
+                              <a:latin typeface="Cambria Math" panose="02040503050406030204" pitchFamily="18" charset="0"/>
+                            </a:rPr>
+                          </m:ctrlPr>
+                        </m:dPr>
+                        <m:e>
+                          <m:r>
+                            <a:rPr lang="en-US" sz="2400" i="1">
+                              <a:solidFill>
+                                <a:srgbClr val="000000"/>
+                              </a:solidFill>
+                              <a:latin typeface="Cambria Math" panose="02040503050406030204" pitchFamily="18" charset="0"/>
+                            </a:rPr>
+                            <m:t>𝑆</m:t>
+                          </m:r>
+                        </m:e>
+                      </m:d>
+                      <m:r>
                         <a:rPr lang="en-US" sz="2400" i="1">
                           <a:solidFill>
                             <a:srgbClr val="000000"/>
                           </a:solidFill>
                           <a:latin typeface="Cambria Math" panose="02040503050406030204" pitchFamily="18" charset="0"/>
                         </a:rPr>
-                        <m:t>𝐻</m:t>
-                      </m:r>
-                      <m:r>
-                        <a:rPr lang="en-US" sz="2400" i="1">
-                          <a:solidFill>
-                            <a:srgbClr val="000000"/>
-                          </a:solidFill>
-                          <a:latin typeface="Cambria Math" panose="02040503050406030204" pitchFamily="18" charset="0"/>
-                        </a:rPr>
-                        <m:t>(</m:t>
-                      </m:r>
-                      <m:r>
-                        <a:rPr lang="en-US" sz="2400" i="1">
-                          <a:solidFill>
-                            <a:srgbClr val="000000"/>
-                          </a:solidFill>
-                          <a:latin typeface="Cambria Math" panose="02040503050406030204" pitchFamily="18" charset="0"/>
-                        </a:rPr>
-                        <m:t>𝑆</m:t>
-                      </m:r>
-                      <m:r>
-                        <a:rPr lang="en-US" sz="2400" i="1">
-                          <a:solidFill>
-                            <a:srgbClr val="000000"/>
-                          </a:solidFill>
-                          <a:latin typeface="Cambria Math" panose="02040503050406030204" pitchFamily="18" charset="0"/>
-                        </a:rPr>
-                        <m:t>)=</m:t>
+                        <m:t>=</m:t>
                       </m:r>
                       <m:f>
                         <m:fPr>
@@ -9974,6 +9979,99 @@
                             </a:rPr>
                             <m:t>1</m:t>
                           </m:r>
+                        </m:den>
+                      </m:f>
+                      <m:r>
+                        <a:rPr lang="en-US" sz="2400" b="0" i="1" smtClean="0">
+                          <a:solidFill>
+                            <a:srgbClr val="000000"/>
+                          </a:solidFill>
+                          <a:latin typeface="Cambria Math" panose="02040503050406030204" pitchFamily="18" charset="0"/>
+                        </a:rPr>
+                        <m:t>=</m:t>
+                      </m:r>
+                      <m:f>
+                        <m:fPr>
+                          <m:ctrlPr>
+                            <a:rPr lang="en-US" sz="2400" b="0" i="1" smtClean="0">
+                              <a:solidFill>
+                                <a:srgbClr val="000000"/>
+                              </a:solidFill>
+                              <a:latin typeface="Cambria Math" panose="02040503050406030204" pitchFamily="18" charset="0"/>
+                            </a:rPr>
+                          </m:ctrlPr>
+                        </m:fPr>
+                        <m:num>
+                          <m:sSub>
+                            <m:sSubPr>
+                              <m:ctrlPr>
+                                <a:rPr lang="en-US" sz="2400" i="1">
+                                  <a:solidFill>
+                                    <a:srgbClr val="000000"/>
+                                  </a:solidFill>
+                                  <a:latin typeface="Cambria Math" panose="02040503050406030204" pitchFamily="18" charset="0"/>
+                                </a:rPr>
+                              </m:ctrlPr>
+                            </m:sSubPr>
+                            <m:e>
+                              <m:r>
+                                <a:rPr lang="en-US" sz="2400" i="1">
+                                  <a:solidFill>
+                                    <a:srgbClr val="000000"/>
+                                  </a:solidFill>
+                                  <a:latin typeface="Cambria Math" panose="02040503050406030204" pitchFamily="18" charset="0"/>
+                                </a:rPr>
+                                <m:t>𝑉</m:t>
+                              </m:r>
+                            </m:e>
+                            <m:sub>
+                              <m:r>
+                                <a:rPr lang="en-US" sz="2400" i="1">
+                                  <a:solidFill>
+                                    <a:srgbClr val="000000"/>
+                                  </a:solidFill>
+                                  <a:latin typeface="Cambria Math" panose="02040503050406030204" pitchFamily="18" charset="0"/>
+                                </a:rPr>
+                                <m:t>𝑜𝑢𝑡</m:t>
+                              </m:r>
+                            </m:sub>
+                          </m:sSub>
+                        </m:num>
+                        <m:den>
+                          <m:sSub>
+                            <m:sSubPr>
+                              <m:ctrlPr>
+                                <a:rPr lang="en-US" sz="2400" i="1">
+                                  <a:solidFill>
+                                    <a:srgbClr val="000000"/>
+                                  </a:solidFill>
+                                  <a:latin typeface="Cambria Math" panose="02040503050406030204" pitchFamily="18" charset="0"/>
+                                </a:rPr>
+                              </m:ctrlPr>
+                            </m:sSubPr>
+                            <m:e>
+                              <m:r>
+                                <a:rPr lang="en-US" sz="2400" i="1">
+                                  <a:solidFill>
+                                    <a:srgbClr val="000000"/>
+                                  </a:solidFill>
+                                  <a:latin typeface="Cambria Math" panose="02040503050406030204" pitchFamily="18" charset="0"/>
+                                </a:rPr>
+                                <m:t>𝑉</m:t>
+                              </m:r>
+                            </m:e>
+                            <m:sub>
+                              <m:r>
+                                <a:rPr lang="en-US" sz="2400" i="1">
+                                  <a:solidFill>
+                                    <a:srgbClr val="000000"/>
+                                  </a:solidFill>
+                                  <a:latin typeface="Cambria Math" panose="02040503050406030204" pitchFamily="18" charset="0"/>
+                                </a:rPr>
+                                <m:t>𝑖𝑛</m:t>
+                              </m:r>
+                            </m:sub>
+                          </m:sSub>
                         </m:den>
                       </m:f>
                     </m:oMath>
@@ -10029,8 +10127,8 @@
           </p:sp>
         </mc:Fallback>
       </mc:AlternateContent>
-      <mc:AlternateContent xmlns:mc="http://schemas.openxmlformats.org/markup-compatibility/2006">
-        <mc:Choice xmlns:a14="http://schemas.microsoft.com/office/drawing/2010/main" Requires="a14">
+      <mc:AlternateContent xmlns:mc="http://schemas.openxmlformats.org/markup-compatibility/2006" xmlns:a14="http://schemas.microsoft.com/office/drawing/2010/main">
+        <mc:Choice Requires="a14">
           <p:sp>
             <p:nvSpPr>
               <p:cNvPr id="14" name="Object 3">
@@ -10220,7 +10318,7 @@
             </p:txBody>
           </p:sp>
         </mc:Choice>
-        <mc:Fallback>
+        <mc:Fallback xmlns="">
           <p:sp>
             <p:nvSpPr>
               <p:cNvPr id="14" name="Object 3">
@@ -10287,7 +10385,7 @@
         </p:blipFill>
         <p:spPr>
           <a:xfrm>
-            <a:off x="4445930" y="3384215"/>
+            <a:off x="5475101" y="3545005"/>
             <a:ext cx="3300139" cy="1905000"/>
           </a:xfrm>
           <a:prstGeom prst="rect">
@@ -10295,6 +10393,278 @@
           </a:prstGeom>
         </p:spPr>
       </p:pic>
+      <mc:AlternateContent xmlns:mc="http://schemas.openxmlformats.org/markup-compatibility/2006">
+        <mc:Choice xmlns:a14="http://schemas.microsoft.com/office/drawing/2010/main" Requires="a14">
+          <p:sp>
+            <p:nvSpPr>
+              <p:cNvPr id="7" name="Object 2">
+                <a:extLst>
+                  <a:ext uri="{FF2B5EF4-FFF2-40B4-BE49-F238E27FC236}">
+                    <a16:creationId xmlns:a16="http://schemas.microsoft.com/office/drawing/2014/main" id="{78E6C8F1-A7E9-4B7A-A54C-5DDC50DC54C4}"/>
+                  </a:ext>
+                </a:extLst>
+              </p:cNvPr>
+              <p:cNvSpPr txBox="1"/>
+              <p:nvPr/>
+            </p:nvSpPr>
+            <p:spPr bwMode="auto">
+              <a:xfrm>
+                <a:off x="416102" y="4027471"/>
+                <a:ext cx="4099390" cy="1050540"/>
+              </a:xfrm>
+              <a:prstGeom prst="rect">
+                <a:avLst/>
+              </a:prstGeom>
+              <a:noFill/>
+            </p:spPr>
+            <p:txBody>
+              <a:bodyPr>
+                <a:normAutofit/>
+              </a:bodyPr>
+              <a:lstStyle/>
+              <a:p>
+                <a:pPr/>
+                <a:r>
+                  <a:rPr lang="en-US" sz="2000" dirty="0">
+                    <a:solidFill>
+                      <a:srgbClr val="000000"/>
+                    </a:solidFill>
+                  </a:rPr>
+                  <a:t>Voltage divider: </a:t>
+                </a:r>
+                <a14:m>
+                  <m:oMath xmlns:m="http://schemas.openxmlformats.org/officeDocument/2006/math">
+                    <m:sSub>
+                      <m:sSubPr>
+                        <m:ctrlPr>
+                          <a:rPr lang="en-US" sz="2400" i="1" smtClean="0">
+                            <a:solidFill>
+                              <a:srgbClr val="000000"/>
+                            </a:solidFill>
+                            <a:latin typeface="Cambria Math" panose="02040503050406030204" pitchFamily="18" charset="0"/>
+                          </a:rPr>
+                        </m:ctrlPr>
+                      </m:sSubPr>
+                      <m:e>
+                        <m:r>
+                          <a:rPr lang="en-US" sz="2400" i="1">
+                            <a:solidFill>
+                              <a:srgbClr val="000000"/>
+                            </a:solidFill>
+                            <a:latin typeface="Cambria Math" panose="02040503050406030204" pitchFamily="18" charset="0"/>
+                          </a:rPr>
+                          <m:t>𝑉</m:t>
+                        </m:r>
+                      </m:e>
+                      <m:sub>
+                        <m:r>
+                          <a:rPr lang="en-US" sz="2400" i="1">
+                            <a:solidFill>
+                              <a:srgbClr val="000000"/>
+                            </a:solidFill>
+                            <a:latin typeface="Cambria Math" panose="02040503050406030204" pitchFamily="18" charset="0"/>
+                          </a:rPr>
+                          <m:t>𝑜𝑢𝑡</m:t>
+                        </m:r>
+                      </m:sub>
+                    </m:sSub>
+                    <m:r>
+                      <a:rPr lang="en-US" sz="2400" i="1">
+                        <a:solidFill>
+                          <a:srgbClr val="000000"/>
+                        </a:solidFill>
+                        <a:latin typeface="Cambria Math" panose="02040503050406030204" pitchFamily="18" charset="0"/>
+                      </a:rPr>
+                      <m:t>=</m:t>
+                    </m:r>
+                    <m:sSub>
+                      <m:sSubPr>
+                        <m:ctrlPr>
+                          <a:rPr lang="en-US" sz="2400" i="1">
+                            <a:solidFill>
+                              <a:srgbClr val="000000"/>
+                            </a:solidFill>
+                            <a:latin typeface="Cambria Math" panose="02040503050406030204" pitchFamily="18" charset="0"/>
+                          </a:rPr>
+                        </m:ctrlPr>
+                      </m:sSubPr>
+                      <m:e>
+                        <m:r>
+                          <a:rPr lang="en-US" sz="2400" i="1">
+                            <a:solidFill>
+                              <a:srgbClr val="000000"/>
+                            </a:solidFill>
+                            <a:latin typeface="Cambria Math" panose="02040503050406030204" pitchFamily="18" charset="0"/>
+                          </a:rPr>
+                          <m:t>𝑉</m:t>
+                        </m:r>
+                      </m:e>
+                      <m:sub>
+                        <m:r>
+                          <a:rPr lang="en-US" sz="2400" i="1">
+                            <a:solidFill>
+                              <a:srgbClr val="000000"/>
+                            </a:solidFill>
+                            <a:latin typeface="Cambria Math" panose="02040503050406030204" pitchFamily="18" charset="0"/>
+                          </a:rPr>
+                          <m:t>𝑖𝑛</m:t>
+                        </m:r>
+                      </m:sub>
+                    </m:sSub>
+                    <m:f>
+                      <m:fPr>
+                        <m:ctrlPr>
+                          <a:rPr lang="en-US" sz="2400" i="1" smtClean="0">
+                            <a:solidFill>
+                              <a:srgbClr val="000000"/>
+                            </a:solidFill>
+                            <a:latin typeface="Cambria Math" panose="02040503050406030204" pitchFamily="18" charset="0"/>
+                          </a:rPr>
+                        </m:ctrlPr>
+                      </m:fPr>
+                      <m:num>
+                        <m:f>
+                          <m:fPr>
+                            <m:ctrlPr>
+                              <a:rPr lang="en-US" sz="2400" i="1">
+                                <a:solidFill>
+                                  <a:srgbClr val="000000"/>
+                                </a:solidFill>
+                                <a:latin typeface="Cambria Math" panose="02040503050406030204" pitchFamily="18" charset="0"/>
+                              </a:rPr>
+                            </m:ctrlPr>
+                          </m:fPr>
+                          <m:num>
+                            <m:r>
+                              <a:rPr lang="en-US" sz="2400" i="1">
+                                <a:solidFill>
+                                  <a:srgbClr val="000000"/>
+                                </a:solidFill>
+                                <a:latin typeface="Cambria Math" panose="02040503050406030204" pitchFamily="18" charset="0"/>
+                              </a:rPr>
+                              <m:t>1</m:t>
+                            </m:r>
+                          </m:num>
+                          <m:den>
+                            <m:r>
+                              <a:rPr lang="en-US" sz="2400" i="1">
+                                <a:solidFill>
+                                  <a:srgbClr val="000000"/>
+                                </a:solidFill>
+                                <a:latin typeface="Cambria Math" panose="02040503050406030204" pitchFamily="18" charset="0"/>
+                              </a:rPr>
+                              <m:t>𝐶𝑆</m:t>
+                            </m:r>
+                          </m:den>
+                        </m:f>
+                      </m:num>
+                      <m:den>
+                        <m:r>
+                          <a:rPr lang="en-US" sz="2400" b="0" i="1" smtClean="0">
+                            <a:solidFill>
+                              <a:srgbClr val="000000"/>
+                            </a:solidFill>
+                            <a:latin typeface="Cambria Math" panose="02040503050406030204" pitchFamily="18" charset="0"/>
+                          </a:rPr>
+                          <m:t>𝑅</m:t>
+                        </m:r>
+                        <m:r>
+                          <a:rPr lang="en-US" sz="2400" b="0" i="1" smtClean="0">
+                            <a:solidFill>
+                              <a:srgbClr val="000000"/>
+                            </a:solidFill>
+                            <a:latin typeface="Cambria Math" panose="02040503050406030204" pitchFamily="18" charset="0"/>
+                          </a:rPr>
+                          <m:t>+</m:t>
+                        </m:r>
+                        <m:f>
+                          <m:fPr>
+                            <m:ctrlPr>
+                              <a:rPr lang="en-US" sz="2400" i="1">
+                                <a:solidFill>
+                                  <a:srgbClr val="000000"/>
+                                </a:solidFill>
+                                <a:latin typeface="Cambria Math" panose="02040503050406030204" pitchFamily="18" charset="0"/>
+                              </a:rPr>
+                            </m:ctrlPr>
+                          </m:fPr>
+                          <m:num>
+                            <m:r>
+                              <a:rPr lang="en-US" sz="2400" i="1">
+                                <a:solidFill>
+                                  <a:srgbClr val="000000"/>
+                                </a:solidFill>
+                                <a:latin typeface="Cambria Math" panose="02040503050406030204" pitchFamily="18" charset="0"/>
+                              </a:rPr>
+                              <m:t>1</m:t>
+                            </m:r>
+                          </m:num>
+                          <m:den>
+                            <m:r>
+                              <a:rPr lang="en-US" sz="2400" i="1">
+                                <a:solidFill>
+                                  <a:srgbClr val="000000"/>
+                                </a:solidFill>
+                                <a:latin typeface="Cambria Math" panose="02040503050406030204" pitchFamily="18" charset="0"/>
+                              </a:rPr>
+                              <m:t>𝐶𝑆</m:t>
+                            </m:r>
+                          </m:den>
+                        </m:f>
+                      </m:den>
+                    </m:f>
+                  </m:oMath>
+                </a14:m>
+                <a:endParaRPr lang="en-US" sz="2000" dirty="0"/>
+              </a:p>
+            </p:txBody>
+          </p:sp>
+        </mc:Choice>
+        <mc:Fallback>
+          <p:sp>
+            <p:nvSpPr>
+              <p:cNvPr id="7" name="Object 2">
+                <a:extLst>
+                  <a:ext uri="{FF2B5EF4-FFF2-40B4-BE49-F238E27FC236}">
+                    <a16:creationId xmlns:a16="http://schemas.microsoft.com/office/drawing/2014/main" id="{78E6C8F1-A7E9-4B7A-A54C-5DDC50DC54C4}"/>
+                  </a:ext>
+                </a:extLst>
+              </p:cNvPr>
+              <p:cNvSpPr txBox="1">
+                <a:spLocks noRot="1" noChangeAspect="1" noMove="1" noResize="1" noEditPoints="1" noAdjustHandles="1" noChangeArrowheads="1" noChangeShapeType="1" noTextEdit="1"/>
+              </p:cNvSpPr>
+              <p:nvPr/>
+            </p:nvSpPr>
+            <p:spPr bwMode="auto">
+              <a:xfrm>
+                <a:off x="416102" y="4027471"/>
+                <a:ext cx="4099390" cy="1050540"/>
+              </a:xfrm>
+              <a:prstGeom prst="rect">
+                <a:avLst/>
+              </a:prstGeom>
+              <a:blipFill>
+                <a:blip r:embed="rId5"/>
+                <a:stretch>
+                  <a:fillRect l="-1486"/>
+                </a:stretch>
+              </a:blipFill>
+            </p:spPr>
+            <p:txBody>
+              <a:bodyPr/>
+              <a:lstStyle/>
+              <a:p>
+                <a:r>
+                  <a:rPr lang="en-US">
+                    <a:noFill/>
+                  </a:rPr>
+                  <a:t> </a:t>
+                </a:r>
+              </a:p>
+            </p:txBody>
+          </p:sp>
+        </mc:Fallback>
+      </mc:AlternateContent>
     </p:spTree>
     <p:extLst>
       <p:ext uri="{BB962C8B-B14F-4D97-AF65-F5344CB8AC3E}">
@@ -10421,8 +10791,8 @@
           </a:p>
         </p:txBody>
       </p:sp>
-      <mc:AlternateContent xmlns:mc="http://schemas.openxmlformats.org/markup-compatibility/2006">
-        <mc:Choice xmlns:a14="http://schemas.microsoft.com/office/drawing/2010/main" Requires="a14">
+      <mc:AlternateContent xmlns:mc="http://schemas.openxmlformats.org/markup-compatibility/2006" xmlns:a14="http://schemas.microsoft.com/office/drawing/2010/main">
+        <mc:Choice Requires="a14">
           <p:sp>
             <p:nvSpPr>
               <p:cNvPr id="7" name="Object 2">
@@ -10595,7 +10965,7 @@
             </p:txBody>
           </p:sp>
         </mc:Choice>
-        <mc:Fallback>
+        <mc:Fallback xmlns="">
           <p:sp>
             <p:nvSpPr>
               <p:cNvPr id="7" name="Object 2">
@@ -10640,8 +11010,8 @@
           </p:sp>
         </mc:Fallback>
       </mc:AlternateContent>
-      <mc:AlternateContent xmlns:mc="http://schemas.openxmlformats.org/markup-compatibility/2006">
-        <mc:Choice xmlns:a14="http://schemas.microsoft.com/office/drawing/2010/main" Requires="a14">
+      <mc:AlternateContent xmlns:mc="http://schemas.openxmlformats.org/markup-compatibility/2006" xmlns:a14="http://schemas.microsoft.com/office/drawing/2010/main">
+        <mc:Choice Requires="a14">
           <p:sp>
             <p:nvSpPr>
               <p:cNvPr id="8" name="Object 2">
@@ -11059,7 +11429,7 @@
             </p:txBody>
           </p:sp>
         </mc:Choice>
-        <mc:Fallback>
+        <mc:Fallback xmlns="">
           <p:sp>
             <p:nvSpPr>
               <p:cNvPr id="8" name="Object 2">
@@ -11107,8 +11477,8 @@
           </p:sp>
         </mc:Fallback>
       </mc:AlternateContent>
-      <mc:AlternateContent xmlns:mc="http://schemas.openxmlformats.org/markup-compatibility/2006">
-        <mc:Choice xmlns:a14="http://schemas.microsoft.com/office/drawing/2010/main" Requires="a14">
+      <mc:AlternateContent xmlns:mc="http://schemas.openxmlformats.org/markup-compatibility/2006" xmlns:a14="http://schemas.microsoft.com/office/drawing/2010/main">
+        <mc:Choice Requires="a14">
           <p:sp>
             <p:nvSpPr>
               <p:cNvPr id="9" name="Object 2">
@@ -11419,7 +11789,7 @@
             </p:txBody>
           </p:sp>
         </mc:Choice>
-        <mc:Fallback>
+        <mc:Fallback xmlns="">
           <p:sp>
             <p:nvSpPr>
               <p:cNvPr id="9" name="Object 2">
@@ -11464,8 +11834,8 @@
           </p:sp>
         </mc:Fallback>
       </mc:AlternateContent>
-      <mc:AlternateContent xmlns:mc="http://schemas.openxmlformats.org/markup-compatibility/2006">
-        <mc:Choice xmlns:a14="http://schemas.microsoft.com/office/drawing/2010/main" Requires="a14">
+      <mc:AlternateContent xmlns:mc="http://schemas.openxmlformats.org/markup-compatibility/2006" xmlns:a14="http://schemas.microsoft.com/office/drawing/2010/main">
+        <mc:Choice Requires="a14">
           <p:sp>
             <p:nvSpPr>
               <p:cNvPr id="10" name="Object 2">
@@ -11863,7 +12233,7 @@
             </p:txBody>
           </p:sp>
         </mc:Choice>
-        <mc:Fallback>
+        <mc:Fallback xmlns="">
           <p:sp>
             <p:nvSpPr>
               <p:cNvPr id="10" name="Object 2">
@@ -11965,8 +12335,8 @@
           </a:p>
         </p:txBody>
       </p:sp>
-      <mc:AlternateContent xmlns:mc="http://schemas.openxmlformats.org/markup-compatibility/2006">
-        <mc:Choice xmlns:a14="http://schemas.microsoft.com/office/drawing/2010/main" Requires="a14">
+      <mc:AlternateContent xmlns:mc="http://schemas.openxmlformats.org/markup-compatibility/2006" xmlns:a14="http://schemas.microsoft.com/office/drawing/2010/main">
+        <mc:Choice Requires="a14">
           <p:sp>
             <p:nvSpPr>
               <p:cNvPr id="15" name="Object 9">
@@ -12277,7 +12647,7 @@
             </p:txBody>
           </p:sp>
         </mc:Choice>
-        <mc:Fallback>
+        <mc:Fallback xmlns="">
           <p:sp>
             <p:nvSpPr>
               <p:cNvPr id="15" name="Object 9">
@@ -12322,8 +12692,8 @@
           </p:sp>
         </mc:Fallback>
       </mc:AlternateContent>
-      <mc:AlternateContent xmlns:mc="http://schemas.openxmlformats.org/markup-compatibility/2006">
-        <mc:Choice xmlns:a14="http://schemas.microsoft.com/office/drawing/2010/main" Requires="a14">
+      <mc:AlternateContent xmlns:mc="http://schemas.openxmlformats.org/markup-compatibility/2006" xmlns:a14="http://schemas.microsoft.com/office/drawing/2010/main">
+        <mc:Choice Requires="a14">
           <p:sp>
             <p:nvSpPr>
               <p:cNvPr id="16" name="Object 11">
@@ -12749,7 +13119,7 @@
             </p:txBody>
           </p:sp>
         </mc:Choice>
-        <mc:Fallback>
+        <mc:Fallback xmlns="">
           <p:sp>
             <p:nvSpPr>
               <p:cNvPr id="16" name="Object 11">
@@ -13210,8 +13580,8 @@
           </a:p>
         </p:txBody>
       </p:sp>
-      <mc:AlternateContent xmlns:mc="http://schemas.openxmlformats.org/markup-compatibility/2006">
-        <mc:Choice xmlns:a14="http://schemas.microsoft.com/office/drawing/2010/main" Requires="a14">
+      <mc:AlternateContent xmlns:mc="http://schemas.openxmlformats.org/markup-compatibility/2006" xmlns:a14="http://schemas.microsoft.com/office/drawing/2010/main">
+        <mc:Choice Requires="a14">
           <p:sp>
             <p:nvSpPr>
               <p:cNvPr id="13" name="Object 4">
@@ -13637,7 +14007,7 @@
             </p:txBody>
           </p:sp>
         </mc:Choice>
-        <mc:Fallback>
+        <mc:Fallback xmlns="">
           <p:sp>
             <p:nvSpPr>
               <p:cNvPr id="13" name="Object 4">
@@ -13682,8 +14052,8 @@
           </p:sp>
         </mc:Fallback>
       </mc:AlternateContent>
-      <mc:AlternateContent xmlns:mc="http://schemas.openxmlformats.org/markup-compatibility/2006">
-        <mc:Choice xmlns:a14="http://schemas.microsoft.com/office/drawing/2010/main" Requires="a14">
+      <mc:AlternateContent xmlns:mc="http://schemas.openxmlformats.org/markup-compatibility/2006" xmlns:a14="http://schemas.microsoft.com/office/drawing/2010/main">
+        <mc:Choice Requires="a14">
           <p:sp>
             <p:nvSpPr>
               <p:cNvPr id="14" name="Object 4">
@@ -14217,7 +14587,7 @@
             </p:txBody>
           </p:sp>
         </mc:Choice>
-        <mc:Fallback>
+        <mc:Fallback xmlns="">
           <p:sp>
             <p:nvSpPr>
               <p:cNvPr id="14" name="Object 4">
@@ -14262,8 +14632,8 @@
           </p:sp>
         </mc:Fallback>
       </mc:AlternateContent>
-      <mc:AlternateContent xmlns:mc="http://schemas.openxmlformats.org/markup-compatibility/2006">
-        <mc:Choice xmlns:a14="http://schemas.microsoft.com/office/drawing/2010/main" Requires="a14">
+      <mc:AlternateContent xmlns:mc="http://schemas.openxmlformats.org/markup-compatibility/2006" xmlns:a14="http://schemas.microsoft.com/office/drawing/2010/main">
+        <mc:Choice Requires="a14">
           <p:sp>
             <p:nvSpPr>
               <p:cNvPr id="17" name="Object 4">
@@ -14887,7 +15257,7 @@
             </p:txBody>
           </p:sp>
         </mc:Choice>
-        <mc:Fallback>
+        <mc:Fallback xmlns="">
           <p:sp>
             <p:nvSpPr>
               <p:cNvPr id="17" name="Object 4">
@@ -19542,8 +19912,8 @@
           </a:p>
         </p:txBody>
       </p:sp>
-      <mc:AlternateContent xmlns:mc="http://schemas.openxmlformats.org/markup-compatibility/2006">
-        <mc:Choice xmlns:a14="http://schemas.microsoft.com/office/drawing/2010/main" Requires="a14">
+      <mc:AlternateContent xmlns:mc="http://schemas.openxmlformats.org/markup-compatibility/2006" xmlns:a14="http://schemas.microsoft.com/office/drawing/2010/main">
+        <mc:Choice Requires="a14">
           <p:sp>
             <p:nvSpPr>
               <p:cNvPr id="54" name="Object 2">
@@ -19729,7 +20099,7 @@
             </p:txBody>
           </p:sp>
         </mc:Choice>
-        <mc:Fallback>
+        <mc:Fallback xmlns="">
           <p:sp>
             <p:nvSpPr>
               <p:cNvPr id="54" name="Object 2">
@@ -19814,8 +20184,8 @@
           </a:p>
         </p:txBody>
       </p:sp>
-      <mc:AlternateContent xmlns:mc="http://schemas.openxmlformats.org/markup-compatibility/2006">
-        <mc:Choice xmlns:a14="http://schemas.microsoft.com/office/drawing/2010/main" Requires="a14">
+      <mc:AlternateContent xmlns:mc="http://schemas.openxmlformats.org/markup-compatibility/2006" xmlns:a14="http://schemas.microsoft.com/office/drawing/2010/main">
+        <mc:Choice Requires="a14">
           <p:sp>
             <p:nvSpPr>
               <p:cNvPr id="57" name="Object 2">
@@ -20166,7 +20536,7 @@
             </p:txBody>
           </p:sp>
         </mc:Choice>
-        <mc:Fallback>
+        <mc:Fallback xmlns="">
           <p:sp>
             <p:nvSpPr>
               <p:cNvPr id="57" name="Object 2">
@@ -20272,8 +20642,8 @@
           </a:p>
         </p:txBody>
       </p:sp>
-      <mc:AlternateContent xmlns:mc="http://schemas.openxmlformats.org/markup-compatibility/2006">
-        <mc:Choice xmlns:a14="http://schemas.microsoft.com/office/drawing/2010/main" Requires="a14">
+      <mc:AlternateContent xmlns:mc="http://schemas.openxmlformats.org/markup-compatibility/2006" xmlns:a14="http://schemas.microsoft.com/office/drawing/2010/main">
+        <mc:Choice Requires="a14">
           <p:sp>
             <p:nvSpPr>
               <p:cNvPr id="68" name="Object 2">
@@ -20726,7 +21096,7 @@
             </p:txBody>
           </p:sp>
         </mc:Choice>
-        <mc:Fallback>
+        <mc:Fallback xmlns="">
           <p:sp>
             <p:nvSpPr>
               <p:cNvPr id="68" name="Object 2">
@@ -21907,8 +22277,8 @@
           </a:p>
         </p:txBody>
       </p:sp>
-      <mc:AlternateContent xmlns:mc="http://schemas.openxmlformats.org/markup-compatibility/2006">
-        <mc:Choice xmlns:a14="http://schemas.microsoft.com/office/drawing/2010/main" Requires="a14">
+      <mc:AlternateContent xmlns:mc="http://schemas.openxmlformats.org/markup-compatibility/2006" xmlns:a14="http://schemas.microsoft.com/office/drawing/2010/main">
+        <mc:Choice Requires="a14">
           <p:sp>
             <p:nvSpPr>
               <p:cNvPr id="24" name="Object 2">
@@ -22317,7 +22687,7 @@
             </p:txBody>
           </p:sp>
         </mc:Choice>
-        <mc:Fallback>
+        <mc:Fallback xmlns="">
           <p:sp>
             <p:nvSpPr>
               <p:cNvPr id="24" name="Object 2">
@@ -22440,8 +22810,8 @@
           </a:p>
         </p:txBody>
       </p:sp>
-      <mc:AlternateContent xmlns:mc="http://schemas.openxmlformats.org/markup-compatibility/2006">
-        <mc:Choice xmlns:a14="http://schemas.microsoft.com/office/drawing/2010/main" Requires="a14">
+      <mc:AlternateContent xmlns:mc="http://schemas.openxmlformats.org/markup-compatibility/2006" xmlns:a14="http://schemas.microsoft.com/office/drawing/2010/main">
+        <mc:Choice Requires="a14">
           <p:sp>
             <p:nvSpPr>
               <p:cNvPr id="26" name="Object 2">
@@ -22949,7 +23319,7 @@
             </p:txBody>
           </p:sp>
         </mc:Choice>
-        <mc:Fallback>
+        <mc:Fallback xmlns="">
           <p:sp>
             <p:nvSpPr>
               <p:cNvPr id="26" name="Object 2">
@@ -22994,8 +23364,8 @@
           </p:sp>
         </mc:Fallback>
       </mc:AlternateContent>
-      <mc:AlternateContent xmlns:mc="http://schemas.openxmlformats.org/markup-compatibility/2006">
-        <mc:Choice xmlns:a14="http://schemas.microsoft.com/office/drawing/2010/main" Requires="a14">
+      <mc:AlternateContent xmlns:mc="http://schemas.openxmlformats.org/markup-compatibility/2006" xmlns:a14="http://schemas.microsoft.com/office/drawing/2010/main">
+        <mc:Choice Requires="a14">
           <p:sp>
             <p:nvSpPr>
               <p:cNvPr id="27" name="Object 2">
@@ -23605,7 +23975,7 @@
             </p:txBody>
           </p:sp>
         </mc:Choice>
-        <mc:Fallback>
+        <mc:Fallback xmlns="">
           <p:sp>
             <p:nvSpPr>
               <p:cNvPr id="27" name="Object 2">
@@ -24966,8 +25336,8 @@
           </a:p>
         </p:txBody>
       </p:sp>
-      <mc:AlternateContent xmlns:mc="http://schemas.openxmlformats.org/markup-compatibility/2006">
-        <mc:Choice xmlns:a14="http://schemas.microsoft.com/office/drawing/2010/main" Requires="a14">
+      <mc:AlternateContent xmlns:mc="http://schemas.openxmlformats.org/markup-compatibility/2006" xmlns:a14="http://schemas.microsoft.com/office/drawing/2010/main">
+        <mc:Choice Requires="a14">
           <p:sp>
             <p:nvSpPr>
               <p:cNvPr id="30" name="Object 2">
@@ -25310,7 +25680,7 @@
             </p:txBody>
           </p:sp>
         </mc:Choice>
-        <mc:Fallback>
+        <mc:Fallback xmlns="">
           <p:sp>
             <p:nvSpPr>
               <p:cNvPr id="30" name="Object 2">
@@ -25355,8 +25725,8 @@
           </p:sp>
         </mc:Fallback>
       </mc:AlternateContent>
-      <mc:AlternateContent xmlns:mc="http://schemas.openxmlformats.org/markup-compatibility/2006">
-        <mc:Choice xmlns:a14="http://schemas.microsoft.com/office/drawing/2010/main" Requires="a14">
+      <mc:AlternateContent xmlns:mc="http://schemas.openxmlformats.org/markup-compatibility/2006" xmlns:a14="http://schemas.microsoft.com/office/drawing/2010/main">
+        <mc:Choice Requires="a14">
           <p:sp>
             <p:nvSpPr>
               <p:cNvPr id="31" name="Object 3">
@@ -25699,7 +26069,7 @@
             </p:txBody>
           </p:sp>
         </mc:Choice>
-        <mc:Fallback>
+        <mc:Fallback xmlns="">
           <p:sp>
             <p:nvSpPr>
               <p:cNvPr id="31" name="Object 3">
@@ -26563,8 +26933,8 @@
           </a:p>
         </p:txBody>
       </p:sp>
-      <mc:AlternateContent xmlns:mc="http://schemas.openxmlformats.org/markup-compatibility/2006">
-        <mc:Choice xmlns:a14="http://schemas.microsoft.com/office/drawing/2010/main" Requires="a14">
+      <mc:AlternateContent xmlns:mc="http://schemas.openxmlformats.org/markup-compatibility/2006" xmlns:a14="http://schemas.microsoft.com/office/drawing/2010/main">
+        <mc:Choice Requires="a14">
           <p:sp>
             <p:nvSpPr>
               <p:cNvPr id="53" name="Object 2">
@@ -26888,7 +27258,7 @@
             </p:txBody>
           </p:sp>
         </mc:Choice>
-        <mc:Fallback>
+        <mc:Fallback xmlns="">
           <p:sp>
             <p:nvSpPr>
               <p:cNvPr id="53" name="Object 2">
@@ -26975,8 +27345,8 @@
           </a:p>
         </p:txBody>
       </p:sp>
-      <mc:AlternateContent xmlns:mc="http://schemas.openxmlformats.org/markup-compatibility/2006">
-        <mc:Choice xmlns:a14="http://schemas.microsoft.com/office/drawing/2010/main" Requires="a14">
+      <mc:AlternateContent xmlns:mc="http://schemas.openxmlformats.org/markup-compatibility/2006" xmlns:a14="http://schemas.microsoft.com/office/drawing/2010/main">
+        <mc:Choice Requires="a14">
           <p:sp>
             <p:nvSpPr>
               <p:cNvPr id="57" name="Object 2">
@@ -27391,7 +27761,7 @@
             </p:txBody>
           </p:sp>
         </mc:Choice>
-        <mc:Fallback>
+        <mc:Fallback xmlns="">
           <p:sp>
             <p:nvSpPr>
               <p:cNvPr id="57" name="Object 2">
@@ -28600,8 +28970,8 @@
           </p:style>
         </p:cxnSp>
       </p:grpSp>
-      <mc:AlternateContent xmlns:mc="http://schemas.openxmlformats.org/markup-compatibility/2006">
-        <mc:Choice xmlns:a14="http://schemas.microsoft.com/office/drawing/2010/main" Requires="a14">
+      <mc:AlternateContent xmlns:mc="http://schemas.openxmlformats.org/markup-compatibility/2006" xmlns:a14="http://schemas.microsoft.com/office/drawing/2010/main">
+        <mc:Choice Requires="a14">
           <p:sp>
             <p:nvSpPr>
               <p:cNvPr id="25" name="مربع نص 10">
@@ -28750,7 +29120,7 @@
             </p:txBody>
           </p:sp>
         </mc:Choice>
-        <mc:Fallback>
+        <mc:Fallback xmlns="">
           <p:sp>
             <p:nvSpPr>
               <p:cNvPr id="25" name="مربع نص 10">
@@ -28795,8 +29165,8 @@
           </p:sp>
         </mc:Fallback>
       </mc:AlternateContent>
-      <mc:AlternateContent xmlns:mc="http://schemas.openxmlformats.org/markup-compatibility/2006">
-        <mc:Choice xmlns:a14="http://schemas.microsoft.com/office/drawing/2010/main" Requires="a14">
+      <mc:AlternateContent xmlns:mc="http://schemas.openxmlformats.org/markup-compatibility/2006" xmlns:a14="http://schemas.microsoft.com/office/drawing/2010/main">
+        <mc:Choice Requires="a14">
           <p:sp>
             <p:nvSpPr>
               <p:cNvPr id="26" name="Object 6">
@@ -29072,7 +29442,7 @@
             </p:txBody>
           </p:sp>
         </mc:Choice>
-        <mc:Fallback>
+        <mc:Fallback xmlns="">
           <p:sp>
             <p:nvSpPr>
               <p:cNvPr id="26" name="Object 6">
@@ -29210,8 +29580,8 @@
           </a:p>
         </p:txBody>
       </p:sp>
-      <mc:AlternateContent xmlns:mc="http://schemas.openxmlformats.org/markup-compatibility/2006">
-        <mc:Choice xmlns:a14="http://schemas.microsoft.com/office/drawing/2010/main" Requires="a14">
+      <mc:AlternateContent xmlns:mc="http://schemas.openxmlformats.org/markup-compatibility/2006" xmlns:a14="http://schemas.microsoft.com/office/drawing/2010/main">
+        <mc:Choice Requires="a14">
           <p:sp>
             <p:nvSpPr>
               <p:cNvPr id="35" name="Object 2">
@@ -29626,7 +29996,7 @@
             </p:txBody>
           </p:sp>
         </mc:Choice>
-        <mc:Fallback>
+        <mc:Fallback xmlns="">
           <p:sp>
             <p:nvSpPr>
               <p:cNvPr id="35" name="Object 2">
@@ -30930,8 +31300,8 @@
           </p:style>
         </p:cxnSp>
       </p:grpSp>
-      <mc:AlternateContent xmlns:mc="http://schemas.openxmlformats.org/markup-compatibility/2006">
-        <mc:Choice xmlns:a14="http://schemas.microsoft.com/office/drawing/2010/main" Requires="a14">
+      <mc:AlternateContent xmlns:mc="http://schemas.openxmlformats.org/markup-compatibility/2006" xmlns:a14="http://schemas.microsoft.com/office/drawing/2010/main">
+        <mc:Choice Requires="a14">
           <p:sp>
             <p:nvSpPr>
               <p:cNvPr id="60" name="Object 2">
@@ -31301,7 +31671,7 @@
             </p:txBody>
           </p:sp>
         </mc:Choice>
-        <mc:Fallback>
+        <mc:Fallback xmlns="">
           <p:sp>
             <p:nvSpPr>
               <p:cNvPr id="60" name="Object 2">
@@ -31346,8 +31716,8 @@
           </p:sp>
         </mc:Fallback>
       </mc:AlternateContent>
-      <mc:AlternateContent xmlns:mc="http://schemas.openxmlformats.org/markup-compatibility/2006">
-        <mc:Choice xmlns:a14="http://schemas.microsoft.com/office/drawing/2010/main" Requires="a14">
+      <mc:AlternateContent xmlns:mc="http://schemas.openxmlformats.org/markup-compatibility/2006" xmlns:a14="http://schemas.microsoft.com/office/drawing/2010/main">
+        <mc:Choice Requires="a14">
           <p:sp>
             <p:nvSpPr>
               <p:cNvPr id="61" name="Object 6">
@@ -31717,7 +32087,7 @@
             </p:txBody>
           </p:sp>
         </mc:Choice>
-        <mc:Fallback>
+        <mc:Fallback xmlns="">
           <p:sp>
             <p:nvSpPr>
               <p:cNvPr id="61" name="Object 6">
@@ -31762,8 +32132,8 @@
           </p:sp>
         </mc:Fallback>
       </mc:AlternateContent>
-      <mc:AlternateContent xmlns:mc="http://schemas.openxmlformats.org/markup-compatibility/2006">
-        <mc:Choice xmlns:a14="http://schemas.microsoft.com/office/drawing/2010/main" Requires="a14">
+      <mc:AlternateContent xmlns:mc="http://schemas.openxmlformats.org/markup-compatibility/2006" xmlns:a14="http://schemas.microsoft.com/office/drawing/2010/main">
+        <mc:Choice Requires="a14">
           <p:sp>
             <p:nvSpPr>
               <p:cNvPr id="62" name="Object 8">
@@ -32373,7 +32743,7 @@
             </p:txBody>
           </p:sp>
         </mc:Choice>
-        <mc:Fallback>
+        <mc:Fallback xmlns="">
           <p:sp>
             <p:nvSpPr>
               <p:cNvPr id="62" name="Object 8">
@@ -32418,8 +32788,8 @@
           </p:sp>
         </mc:Fallback>
       </mc:AlternateContent>
-      <mc:AlternateContent xmlns:mc="http://schemas.openxmlformats.org/markup-compatibility/2006">
-        <mc:Choice xmlns:a14="http://schemas.microsoft.com/office/drawing/2010/main" Requires="a14">
+      <mc:AlternateContent xmlns:mc="http://schemas.openxmlformats.org/markup-compatibility/2006" xmlns:a14="http://schemas.microsoft.com/office/drawing/2010/main">
+        <mc:Choice Requires="a14">
           <p:sp>
             <p:nvSpPr>
               <p:cNvPr id="64" name="Object 2">
@@ -32856,7 +33226,7 @@
             </p:txBody>
           </p:sp>
         </mc:Choice>
-        <mc:Fallback>
+        <mc:Fallback xmlns="">
           <p:sp>
             <p:nvSpPr>
               <p:cNvPr id="64" name="Object 2">
@@ -32951,8 +33321,8 @@
           </a:p>
         </p:txBody>
       </p:sp>
-      <mc:AlternateContent xmlns:mc="http://schemas.openxmlformats.org/markup-compatibility/2006">
-        <mc:Choice xmlns:a14="http://schemas.microsoft.com/office/drawing/2010/main" Requires="a14">
+      <mc:AlternateContent xmlns:mc="http://schemas.openxmlformats.org/markup-compatibility/2006" xmlns:a14="http://schemas.microsoft.com/office/drawing/2010/main">
+        <mc:Choice Requires="a14">
           <p:sp>
             <p:nvSpPr>
               <p:cNvPr id="66" name="Object 2">
@@ -33324,7 +33694,7 @@
             </p:txBody>
           </p:sp>
         </mc:Choice>
-        <mc:Fallback>
+        <mc:Fallback xmlns="">
           <p:sp>
             <p:nvSpPr>
               <p:cNvPr id="66" name="Object 2">
@@ -34671,8 +35041,8 @@
           </a:p>
         </p:txBody>
       </p:sp>
-      <mc:AlternateContent xmlns:mc="http://schemas.openxmlformats.org/markup-compatibility/2006">
-        <mc:Choice xmlns:a14="http://schemas.microsoft.com/office/drawing/2010/main" Requires="a14">
+      <mc:AlternateContent xmlns:mc="http://schemas.openxmlformats.org/markup-compatibility/2006" xmlns:a14="http://schemas.microsoft.com/office/drawing/2010/main">
+        <mc:Choice Requires="a14">
           <p:sp>
             <p:nvSpPr>
               <p:cNvPr id="31" name="Object 2">
@@ -35191,7 +35561,7 @@
             </p:txBody>
           </p:sp>
         </mc:Choice>
-        <mc:Fallback>
+        <mc:Fallback xmlns="">
           <p:sp>
             <p:nvSpPr>
               <p:cNvPr id="31" name="Object 2">
@@ -35236,8 +35606,8 @@
           </p:sp>
         </mc:Fallback>
       </mc:AlternateContent>
-      <mc:AlternateContent xmlns:mc="http://schemas.openxmlformats.org/markup-compatibility/2006">
-        <mc:Choice xmlns:a14="http://schemas.microsoft.com/office/drawing/2010/main" Requires="a14">
+      <mc:AlternateContent xmlns:mc="http://schemas.openxmlformats.org/markup-compatibility/2006" xmlns:a14="http://schemas.microsoft.com/office/drawing/2010/main">
+        <mc:Choice Requires="a14">
           <p:sp>
             <p:nvSpPr>
               <p:cNvPr id="32" name="Object 6">
@@ -35547,7 +35917,7 @@
             </p:txBody>
           </p:sp>
         </mc:Choice>
-        <mc:Fallback>
+        <mc:Fallback xmlns="">
           <p:sp>
             <p:nvSpPr>
               <p:cNvPr id="32" name="Object 6">
@@ -35654,8 +36024,8 @@
           </a:p>
         </p:txBody>
       </p:sp>
-      <mc:AlternateContent xmlns:mc="http://schemas.openxmlformats.org/markup-compatibility/2006">
-        <mc:Choice xmlns:a14="http://schemas.microsoft.com/office/drawing/2010/main" Requires="a14">
+      <mc:AlternateContent xmlns:mc="http://schemas.openxmlformats.org/markup-compatibility/2006" xmlns:a14="http://schemas.microsoft.com/office/drawing/2010/main">
+        <mc:Choice Requires="a14">
           <p:sp>
             <p:nvSpPr>
               <p:cNvPr id="34" name="مربع نص 10">
@@ -35804,7 +36174,7 @@
             </p:txBody>
           </p:sp>
         </mc:Choice>
-        <mc:Fallback>
+        <mc:Fallback xmlns="">
           <p:sp>
             <p:nvSpPr>
               <p:cNvPr id="34" name="مربع نص 10">
@@ -37811,8 +38181,8 @@
           </p:txBody>
         </p:sp>
       </p:grpSp>
-      <mc:AlternateContent xmlns:mc="http://schemas.openxmlformats.org/markup-compatibility/2006">
-        <mc:Choice xmlns:a14="http://schemas.microsoft.com/office/drawing/2010/main" Requires="a14">
+      <mc:AlternateContent xmlns:mc="http://schemas.openxmlformats.org/markup-compatibility/2006" xmlns:a14="http://schemas.microsoft.com/office/drawing/2010/main">
+        <mc:Choice Requires="a14">
           <p:sp>
             <p:nvSpPr>
               <p:cNvPr id="45" name="Object 2">
@@ -38293,7 +38663,7 @@
             </p:txBody>
           </p:sp>
         </mc:Choice>
-        <mc:Fallback>
+        <mc:Fallback xmlns="">
           <p:sp>
             <p:nvSpPr>
               <p:cNvPr id="45" name="Object 2">
@@ -38338,8 +38708,8 @@
           </p:sp>
         </mc:Fallback>
       </mc:AlternateContent>
-      <mc:AlternateContent xmlns:mc="http://schemas.openxmlformats.org/markup-compatibility/2006">
-        <mc:Choice xmlns:a14="http://schemas.microsoft.com/office/drawing/2010/main" Requires="a14">
+      <mc:AlternateContent xmlns:mc="http://schemas.openxmlformats.org/markup-compatibility/2006" xmlns:a14="http://schemas.microsoft.com/office/drawing/2010/main">
+        <mc:Choice Requires="a14">
           <p:sp>
             <p:nvSpPr>
               <p:cNvPr id="46" name="Object 6">
@@ -38820,7 +39190,7 @@
             </p:txBody>
           </p:sp>
         </mc:Choice>
-        <mc:Fallback>
+        <mc:Fallback xmlns="">
           <p:sp>
             <p:nvSpPr>
               <p:cNvPr id="46" name="Object 6">
@@ -38865,8 +39235,8 @@
           </p:sp>
         </mc:Fallback>
       </mc:AlternateContent>
-      <mc:AlternateContent xmlns:mc="http://schemas.openxmlformats.org/markup-compatibility/2006">
-        <mc:Choice xmlns:a14="http://schemas.microsoft.com/office/drawing/2010/main" Requires="a14">
+      <mc:AlternateContent xmlns:mc="http://schemas.openxmlformats.org/markup-compatibility/2006" xmlns:a14="http://schemas.microsoft.com/office/drawing/2010/main">
+        <mc:Choice Requires="a14">
           <p:sp>
             <p:nvSpPr>
               <p:cNvPr id="47" name="Object 2">
@@ -39550,7 +39920,7 @@
             </p:txBody>
           </p:sp>
         </mc:Choice>
-        <mc:Fallback>
+        <mc:Fallback xmlns="">
           <p:sp>
             <p:nvSpPr>
               <p:cNvPr id="47" name="Object 2">
@@ -39637,8 +40007,8 @@
           </a:p>
         </p:txBody>
       </p:sp>
-      <mc:AlternateContent xmlns:mc="http://schemas.openxmlformats.org/markup-compatibility/2006">
-        <mc:Choice xmlns:a14="http://schemas.microsoft.com/office/drawing/2010/main" Requires="a14">
+      <mc:AlternateContent xmlns:mc="http://schemas.openxmlformats.org/markup-compatibility/2006" xmlns:a14="http://schemas.microsoft.com/office/drawing/2010/main">
+        <mc:Choice Requires="a14">
           <p:sp>
             <p:nvSpPr>
               <p:cNvPr id="50" name="Object 2">
@@ -40160,7 +40530,7 @@
             </p:txBody>
           </p:sp>
         </mc:Choice>
-        <mc:Fallback>
+        <mc:Fallback xmlns="">
           <p:sp>
             <p:nvSpPr>
               <p:cNvPr id="50" name="Object 2">

</xml_diff>